<commit_message>
Comment on p-values for 2-tailed test
</commit_message>
<xml_diff>
--- a/Day16_HypothesisTesting_SingleMean.pptx
+++ b/Day16_HypothesisTesting_SingleMean.pptx
@@ -17,12 +17,13 @@
     <p:sldId id="347" r:id="rId11"/>
     <p:sldId id="342" r:id="rId12"/>
     <p:sldId id="337" r:id="rId13"/>
-    <p:sldId id="336" r:id="rId14"/>
-    <p:sldId id="339" r:id="rId15"/>
-    <p:sldId id="338" r:id="rId16"/>
-    <p:sldId id="341" r:id="rId17"/>
-    <p:sldId id="333" r:id="rId18"/>
-    <p:sldId id="267" r:id="rId19"/>
+    <p:sldId id="350" r:id="rId14"/>
+    <p:sldId id="336" r:id="rId15"/>
+    <p:sldId id="339" r:id="rId16"/>
+    <p:sldId id="338" r:id="rId17"/>
+    <p:sldId id="341" r:id="rId18"/>
+    <p:sldId id="333" r:id="rId19"/>
+    <p:sldId id="267" r:id="rId20"/>
   </p:sldIdLst>
   <p:sldSz cx="12192000" cy="6858000"/>
   <p:notesSz cx="6858000" cy="9144000"/>
@@ -5631,6 +5632,611 @@
           <p:cNvPr id="2" name="Title 1">
             <a:extLst>
               <a:ext uri="{FF2B5EF4-FFF2-40B4-BE49-F238E27FC236}">
+                <a16:creationId xmlns:a16="http://schemas.microsoft.com/office/drawing/2014/main" id="{E6A13330-FBAE-9468-CD00-AB8640BAD2A1}"/>
+              </a:ext>
+            </a:extLst>
+          </p:cNvPr>
+          <p:cNvSpPr>
+            <a:spLocks noGrp="1"/>
+          </p:cNvSpPr>
+          <p:nvPr>
+            <p:ph type="title"/>
+          </p:nvPr>
+        </p:nvSpPr>
+        <p:spPr/>
+        <p:txBody>
+          <a:bodyPr/>
+          <a:lstStyle/>
+          <a:p>
+            <a:br>
+              <a:rPr lang="en-US" dirty="0"/>
+            </a:br>
+            <a:r>
+              <a:rPr lang="en-US" dirty="0"/>
+              <a:t>A Comment on the Previous Example</a:t>
+            </a:r>
+          </a:p>
+        </p:txBody>
+      </p:sp>
+      <mc:AlternateContent xmlns:mc="http://schemas.openxmlformats.org/markup-compatibility/2006">
+        <mc:Choice xmlns:a14="http://schemas.microsoft.com/office/drawing/2010/main" Requires="a14">
+          <p:sp>
+            <p:nvSpPr>
+              <p:cNvPr id="3" name="Content Placeholder 2">
+                <a:extLst>
+                  <a:ext uri="{FF2B5EF4-FFF2-40B4-BE49-F238E27FC236}">
+                    <a16:creationId xmlns:a16="http://schemas.microsoft.com/office/drawing/2014/main" id="{7E1D7FED-591E-0DC1-E933-D6568E0CE206}"/>
+                  </a:ext>
+                </a:extLst>
+              </p:cNvPr>
+              <p:cNvSpPr>
+                <a:spLocks noGrp="1"/>
+              </p:cNvSpPr>
+              <p:nvPr>
+                <p:ph idx="1"/>
+              </p:nvPr>
+            </p:nvSpPr>
+            <p:spPr/>
+            <p:txBody>
+              <a:bodyPr/>
+              <a:lstStyle/>
+              <a:p>
+                <a:pPr marL="0" indent="0">
+                  <a:buNone/>
+                </a:pPr>
+                <a:r>
+                  <a:rPr lang="en-US" b="1" dirty="0"/>
+                  <a:t>Note on the p-value:</a:t>
+                </a:r>
+                <a:r>
+                  <a:rPr lang="en-US" dirty="0"/>
+                  <a:t> In the previous example, the test was to determine whether the true average change in blood pressure was </a:t>
+                </a:r>
+                <a:r>
+                  <a:rPr lang="en-US" b="1" i="1" dirty="0"/>
+                  <a:t>different</a:t>
+                </a:r>
+                <a:r>
+                  <a:rPr lang="en-US" dirty="0"/>
+                  <a:t> from the claimed value</a:t>
+                </a:r>
+              </a:p>
+              <a:p>
+                <a:pPr lvl="1"/>
+                <a:r>
+                  <a:rPr lang="en-US" dirty="0"/>
+                  <a:t>In this case, the test is </a:t>
+                </a:r>
+                <a:r>
+                  <a:rPr lang="en-US" i="1" dirty="0"/>
+                  <a:t>two-tailed</a:t>
+                </a:r>
+                <a:r>
+                  <a:rPr lang="en-US" dirty="0"/>
+                  <a:t> </a:t>
+                </a:r>
+              </a:p>
+              <a:p>
+                <a:pPr lvl="2"/>
+                <a:r>
+                  <a:rPr lang="en-US" dirty="0"/>
+                  <a:t>There are two types of sample which would lead us to believe the alternative hypothesis over the null hypothesis</a:t>
+                </a:r>
+              </a:p>
+              <a:p>
+                <a:pPr lvl="1"/>
+                <a:r>
+                  <a:rPr lang="en-US" dirty="0"/>
+                  <a:t>Because of this, we must multiply our calculated area by 2 to obtain the </a:t>
+                </a:r>
+                <a14:m>
+                  <m:oMath xmlns:m="http://schemas.openxmlformats.org/officeDocument/2006/math">
+                    <m:r>
+                      <a:rPr lang="en-US" b="0" i="1" smtClean="0">
+                        <a:latin typeface="Cambria Math" panose="02040503050406030204" pitchFamily="18" charset="0"/>
+                      </a:rPr>
+                      <m:t>𝑝</m:t>
+                    </m:r>
+                  </m:oMath>
+                </a14:m>
+                <a:r>
+                  <a:rPr lang="en-US" dirty="0"/>
+                  <a:t>-value</a:t>
+                </a:r>
+              </a:p>
+            </p:txBody>
+          </p:sp>
+        </mc:Choice>
+        <mc:Fallback>
+          <p:sp>
+            <p:nvSpPr>
+              <p:cNvPr id="3" name="Content Placeholder 2">
+                <a:extLst>
+                  <a:ext uri="{FF2B5EF4-FFF2-40B4-BE49-F238E27FC236}">
+                    <a16:creationId xmlns:a16="http://schemas.microsoft.com/office/drawing/2014/main" id="{7E1D7FED-591E-0DC1-E933-D6568E0CE206}"/>
+                  </a:ext>
+                </a:extLst>
+              </p:cNvPr>
+              <p:cNvSpPr>
+                <a:spLocks noGrp="1" noRot="1" noChangeAspect="1" noMove="1" noResize="1" noEditPoints="1" noAdjustHandles="1" noChangeArrowheads="1" noChangeShapeType="1" noTextEdit="1"/>
+              </p:cNvSpPr>
+              <p:nvPr>
+                <p:ph idx="1"/>
+              </p:nvPr>
+            </p:nvSpPr>
+            <p:spPr>
+              <a:blipFill>
+                <a:blip r:embed="rId2"/>
+                <a:stretch>
+                  <a:fillRect l="-661"/>
+                </a:stretch>
+              </a:blipFill>
+            </p:spPr>
+            <p:txBody>
+              <a:bodyPr/>
+              <a:lstStyle/>
+              <a:p>
+                <a:r>
+                  <a:rPr lang="en-US">
+                    <a:noFill/>
+                  </a:rPr>
+                  <a:t> </a:t>
+                </a:r>
+              </a:p>
+            </p:txBody>
+          </p:sp>
+        </mc:Fallback>
+      </mc:AlternateContent>
+      <mc:AlternateContent xmlns:mc="http://schemas.openxmlformats.org/markup-compatibility/2006">
+        <mc:Choice xmlns:a14="http://schemas.microsoft.com/office/drawing/2010/main" Requires="a14">
+          <p:sp>
+            <p:nvSpPr>
+              <p:cNvPr id="4" name="TextBox 3">
+                <a:extLst>
+                  <a:ext uri="{FF2B5EF4-FFF2-40B4-BE49-F238E27FC236}">
+                    <a16:creationId xmlns:a16="http://schemas.microsoft.com/office/drawing/2014/main" id="{002F09E6-32ED-FA30-A2B5-2226C95F36E2}"/>
+                  </a:ext>
+                </a:extLst>
+              </p:cNvPr>
+              <p:cNvSpPr txBox="1"/>
+              <p:nvPr/>
+            </p:nvSpPr>
+            <p:spPr>
+              <a:xfrm>
+                <a:off x="3470259" y="4267202"/>
+                <a:ext cx="5565913" cy="1754326"/>
+              </a:xfrm>
+              <a:prstGeom prst="rect">
+                <a:avLst/>
+              </a:prstGeom>
+              <a:noFill/>
+              <a:ln w="19050">
+                <a:solidFill>
+                  <a:schemeClr val="accent1"/>
+                </a:solidFill>
+              </a:ln>
+            </p:spPr>
+            <p:txBody>
+              <a:bodyPr wrap="square" rtlCol="0">
+                <a:spAutoFit/>
+              </a:bodyPr>
+              <a:lstStyle/>
+              <a:p>
+                <a:r>
+                  <a:rPr lang="en-US" b="1" dirty="0"/>
+                  <a:t>P-values for two-tailed tests: </a:t>
+                </a:r>
+                <a:r>
+                  <a:rPr lang="en-US" dirty="0"/>
+                  <a:t>In any test for a </a:t>
+                </a:r>
+                <a:r>
+                  <a:rPr lang="en-US" i="1" dirty="0"/>
+                  <a:t>change</a:t>
+                </a:r>
+                <a:r>
+                  <a:rPr lang="en-US" dirty="0"/>
+                  <a:t> or </a:t>
+                </a:r>
+                <a:r>
+                  <a:rPr lang="en-US" i="1" dirty="0"/>
+                  <a:t>difference</a:t>
+                </a:r>
+                <a:r>
+                  <a:rPr lang="en-US" dirty="0"/>
+                  <a:t> (tests in which the alternative hypothesis uses a ”not equal to” symbol, </a:t>
+                </a:r>
+                <a14:m>
+                  <m:oMath xmlns:m="http://schemas.openxmlformats.org/officeDocument/2006/math">
+                    <m:r>
+                      <a:rPr lang="en-US" b="0" i="1" smtClean="0">
+                        <a:latin typeface="Cambria Math" panose="02040503050406030204" pitchFamily="18" charset="0"/>
+                      </a:rPr>
+                      <m:t>≠</m:t>
+                    </m:r>
+                  </m:oMath>
+                </a14:m>
+                <a:r>
+                  <a:rPr lang="en-US" dirty="0"/>
+                  <a:t>), the area from the test statistic and into the tail of the distribution must be doubled in order to obtain the true </a:t>
+                </a:r>
+                <a14:m>
+                  <m:oMath xmlns:m="http://schemas.openxmlformats.org/officeDocument/2006/math">
+                    <m:r>
+                      <a:rPr lang="en-US" b="0" i="1" smtClean="0">
+                        <a:latin typeface="Cambria Math" panose="02040503050406030204" pitchFamily="18" charset="0"/>
+                      </a:rPr>
+                      <m:t>𝑝</m:t>
+                    </m:r>
+                  </m:oMath>
+                </a14:m>
+                <a:r>
+                  <a:rPr lang="en-US" dirty="0"/>
+                  <a:t>-value for the test</a:t>
+                </a:r>
+              </a:p>
+            </p:txBody>
+          </p:sp>
+        </mc:Choice>
+        <mc:Fallback>
+          <p:sp>
+            <p:nvSpPr>
+              <p:cNvPr id="4" name="TextBox 3">
+                <a:extLst>
+                  <a:ext uri="{FF2B5EF4-FFF2-40B4-BE49-F238E27FC236}">
+                    <a16:creationId xmlns:a16="http://schemas.microsoft.com/office/drawing/2014/main" id="{002F09E6-32ED-FA30-A2B5-2226C95F36E2}"/>
+                  </a:ext>
+                </a:extLst>
+              </p:cNvPr>
+              <p:cNvSpPr txBox="1">
+                <a:spLocks noRot="1" noChangeAspect="1" noMove="1" noResize="1" noEditPoints="1" noAdjustHandles="1" noChangeArrowheads="1" noChangeShapeType="1" noTextEdit="1"/>
+              </p:cNvSpPr>
+              <p:nvPr/>
+            </p:nvSpPr>
+            <p:spPr>
+              <a:xfrm>
+                <a:off x="3470259" y="4267202"/>
+                <a:ext cx="5565913" cy="1754326"/>
+              </a:xfrm>
+              <a:prstGeom prst="rect">
+                <a:avLst/>
+              </a:prstGeom>
+              <a:blipFill>
+                <a:blip r:embed="rId3"/>
+                <a:stretch>
+                  <a:fillRect l="-680" t="-709" r="-1587" b="-3546"/>
+                </a:stretch>
+              </a:blipFill>
+              <a:ln w="19050">
+                <a:solidFill>
+                  <a:schemeClr val="accent1"/>
+                </a:solidFill>
+              </a:ln>
+            </p:spPr>
+            <p:txBody>
+              <a:bodyPr/>
+              <a:lstStyle/>
+              <a:p>
+                <a:r>
+                  <a:rPr lang="en-US">
+                    <a:noFill/>
+                  </a:rPr>
+                  <a:t> </a:t>
+                </a:r>
+              </a:p>
+            </p:txBody>
+          </p:sp>
+        </mc:Fallback>
+      </mc:AlternateContent>
+    </p:spTree>
+    <p:extLst>
+      <p:ext uri="{BB962C8B-B14F-4D97-AF65-F5344CB8AC3E}">
+        <p14:creationId xmlns:p14="http://schemas.microsoft.com/office/powerpoint/2010/main" val="4259106468"/>
+      </p:ext>
+    </p:extLst>
+  </p:cSld>
+  <p:clrMapOvr>
+    <a:masterClrMapping/>
+  </p:clrMapOvr>
+  <p:timing>
+    <p:tnLst>
+      <p:par>
+        <p:cTn id="1" dur="indefinite" restart="never" nodeType="tmRoot">
+          <p:childTnLst>
+            <p:seq concurrent="1" nextAc="seek">
+              <p:cTn id="2" dur="indefinite" nodeType="mainSeq">
+                <p:childTnLst>
+                  <p:par>
+                    <p:cTn id="3" fill="hold">
+                      <p:stCondLst>
+                        <p:cond delay="indefinite"/>
+                      </p:stCondLst>
+                      <p:childTnLst>
+                        <p:par>
+                          <p:cTn id="4" fill="hold">
+                            <p:stCondLst>
+                              <p:cond delay="0"/>
+                            </p:stCondLst>
+                            <p:childTnLst>
+                              <p:par>
+                                <p:cTn id="5" presetID="1" presetClass="entr" presetSubtype="0" fill="hold" nodeType="clickEffect">
+                                  <p:stCondLst>
+                                    <p:cond delay="0"/>
+                                  </p:stCondLst>
+                                  <p:childTnLst>
+                                    <p:set>
+                                      <p:cBhvr>
+                                        <p:cTn id="6" dur="1" fill="hold">
+                                          <p:stCondLst>
+                                            <p:cond delay="0"/>
+                                          </p:stCondLst>
+                                        </p:cTn>
+                                        <p:tgtEl>
+                                          <p:spTgt spid="3">
+                                            <p:txEl>
+                                              <p:pRg st="0" end="0"/>
+                                            </p:txEl>
+                                          </p:spTgt>
+                                        </p:tgtEl>
+                                        <p:attrNameLst>
+                                          <p:attrName>style.visibility</p:attrName>
+                                        </p:attrNameLst>
+                                      </p:cBhvr>
+                                      <p:to>
+                                        <p:strVal val="visible"/>
+                                      </p:to>
+                                    </p:set>
+                                  </p:childTnLst>
+                                </p:cTn>
+                              </p:par>
+                            </p:childTnLst>
+                          </p:cTn>
+                        </p:par>
+                      </p:childTnLst>
+                    </p:cTn>
+                  </p:par>
+                  <p:par>
+                    <p:cTn id="7" fill="hold">
+                      <p:stCondLst>
+                        <p:cond delay="indefinite"/>
+                      </p:stCondLst>
+                      <p:childTnLst>
+                        <p:par>
+                          <p:cTn id="8" fill="hold">
+                            <p:stCondLst>
+                              <p:cond delay="0"/>
+                            </p:stCondLst>
+                            <p:childTnLst>
+                              <p:par>
+                                <p:cTn id="9" presetID="1" presetClass="entr" presetSubtype="0" fill="hold" nodeType="clickEffect">
+                                  <p:stCondLst>
+                                    <p:cond delay="0"/>
+                                  </p:stCondLst>
+                                  <p:childTnLst>
+                                    <p:set>
+                                      <p:cBhvr>
+                                        <p:cTn id="10" dur="1" fill="hold">
+                                          <p:stCondLst>
+                                            <p:cond delay="0"/>
+                                          </p:stCondLst>
+                                        </p:cTn>
+                                        <p:tgtEl>
+                                          <p:spTgt spid="3">
+                                            <p:txEl>
+                                              <p:pRg st="1" end="1"/>
+                                            </p:txEl>
+                                          </p:spTgt>
+                                        </p:tgtEl>
+                                        <p:attrNameLst>
+                                          <p:attrName>style.visibility</p:attrName>
+                                        </p:attrNameLst>
+                                      </p:cBhvr>
+                                      <p:to>
+                                        <p:strVal val="visible"/>
+                                      </p:to>
+                                    </p:set>
+                                  </p:childTnLst>
+                                </p:cTn>
+                              </p:par>
+                            </p:childTnLst>
+                          </p:cTn>
+                        </p:par>
+                      </p:childTnLst>
+                    </p:cTn>
+                  </p:par>
+                  <p:par>
+                    <p:cTn id="11" fill="hold">
+                      <p:stCondLst>
+                        <p:cond delay="indefinite"/>
+                      </p:stCondLst>
+                      <p:childTnLst>
+                        <p:par>
+                          <p:cTn id="12" fill="hold">
+                            <p:stCondLst>
+                              <p:cond delay="0"/>
+                            </p:stCondLst>
+                            <p:childTnLst>
+                              <p:par>
+                                <p:cTn id="13" presetID="1" presetClass="entr" presetSubtype="0" fill="hold" nodeType="clickEffect">
+                                  <p:stCondLst>
+                                    <p:cond delay="0"/>
+                                  </p:stCondLst>
+                                  <p:childTnLst>
+                                    <p:set>
+                                      <p:cBhvr>
+                                        <p:cTn id="14" dur="1" fill="hold">
+                                          <p:stCondLst>
+                                            <p:cond delay="0"/>
+                                          </p:stCondLst>
+                                        </p:cTn>
+                                        <p:tgtEl>
+                                          <p:spTgt spid="3">
+                                            <p:txEl>
+                                              <p:pRg st="2" end="2"/>
+                                            </p:txEl>
+                                          </p:spTgt>
+                                        </p:tgtEl>
+                                        <p:attrNameLst>
+                                          <p:attrName>style.visibility</p:attrName>
+                                        </p:attrNameLst>
+                                      </p:cBhvr>
+                                      <p:to>
+                                        <p:strVal val="visible"/>
+                                      </p:to>
+                                    </p:set>
+                                  </p:childTnLst>
+                                </p:cTn>
+                              </p:par>
+                            </p:childTnLst>
+                          </p:cTn>
+                        </p:par>
+                      </p:childTnLst>
+                    </p:cTn>
+                  </p:par>
+                  <p:par>
+                    <p:cTn id="15" fill="hold">
+                      <p:stCondLst>
+                        <p:cond delay="indefinite"/>
+                      </p:stCondLst>
+                      <p:childTnLst>
+                        <p:par>
+                          <p:cTn id="16" fill="hold">
+                            <p:stCondLst>
+                              <p:cond delay="0"/>
+                            </p:stCondLst>
+                            <p:childTnLst>
+                              <p:par>
+                                <p:cTn id="17" presetID="1" presetClass="entr" presetSubtype="0" fill="hold" nodeType="clickEffect">
+                                  <p:stCondLst>
+                                    <p:cond delay="0"/>
+                                  </p:stCondLst>
+                                  <p:childTnLst>
+                                    <p:set>
+                                      <p:cBhvr>
+                                        <p:cTn id="18" dur="1" fill="hold">
+                                          <p:stCondLst>
+                                            <p:cond delay="0"/>
+                                          </p:stCondLst>
+                                        </p:cTn>
+                                        <p:tgtEl>
+                                          <p:spTgt spid="3">
+                                            <p:txEl>
+                                              <p:pRg st="3" end="3"/>
+                                            </p:txEl>
+                                          </p:spTgt>
+                                        </p:tgtEl>
+                                        <p:attrNameLst>
+                                          <p:attrName>style.visibility</p:attrName>
+                                        </p:attrNameLst>
+                                      </p:cBhvr>
+                                      <p:to>
+                                        <p:strVal val="visible"/>
+                                      </p:to>
+                                    </p:set>
+                                  </p:childTnLst>
+                                </p:cTn>
+                              </p:par>
+                            </p:childTnLst>
+                          </p:cTn>
+                        </p:par>
+                      </p:childTnLst>
+                    </p:cTn>
+                  </p:par>
+                  <p:par>
+                    <p:cTn id="19" fill="hold">
+                      <p:stCondLst>
+                        <p:cond delay="indefinite"/>
+                      </p:stCondLst>
+                      <p:childTnLst>
+                        <p:par>
+                          <p:cTn id="20" fill="hold">
+                            <p:stCondLst>
+                              <p:cond delay="0"/>
+                            </p:stCondLst>
+                            <p:childTnLst>
+                              <p:par>
+                                <p:cTn id="21" presetID="1" presetClass="entr" presetSubtype="0" fill="hold" grpId="0" nodeType="clickEffect">
+                                  <p:stCondLst>
+                                    <p:cond delay="0"/>
+                                  </p:stCondLst>
+                                  <p:childTnLst>
+                                    <p:set>
+                                      <p:cBhvr>
+                                        <p:cTn id="22" dur="1" fill="hold">
+                                          <p:stCondLst>
+                                            <p:cond delay="0"/>
+                                          </p:stCondLst>
+                                        </p:cTn>
+                                        <p:tgtEl>
+                                          <p:spTgt spid="4"/>
+                                        </p:tgtEl>
+                                        <p:attrNameLst>
+                                          <p:attrName>style.visibility</p:attrName>
+                                        </p:attrNameLst>
+                                      </p:cBhvr>
+                                      <p:to>
+                                        <p:strVal val="visible"/>
+                                      </p:to>
+                                    </p:set>
+                                  </p:childTnLst>
+                                </p:cTn>
+                              </p:par>
+                            </p:childTnLst>
+                          </p:cTn>
+                        </p:par>
+                      </p:childTnLst>
+                    </p:cTn>
+                  </p:par>
+                </p:childTnLst>
+              </p:cTn>
+              <p:prevCondLst>
+                <p:cond evt="onPrev" delay="0">
+                  <p:tgtEl>
+                    <p:sldTgt/>
+                  </p:tgtEl>
+                </p:cond>
+              </p:prevCondLst>
+              <p:nextCondLst>
+                <p:cond evt="onNext" delay="0">
+                  <p:tgtEl>
+                    <p:sldTgt/>
+                  </p:tgtEl>
+                </p:cond>
+              </p:nextCondLst>
+            </p:seq>
+          </p:childTnLst>
+        </p:cTn>
+      </p:par>
+    </p:tnLst>
+    <p:bldLst>
+      <p:bldP spid="4" grpId="0" animBg="1"/>
+    </p:bldLst>
+  </p:timing>
+</p:sld>
+</file>
+
+<file path=ppt/slides/slide14.xml><?xml version="1.0" encoding="utf-8"?>
+<p:sld xmlns:a="http://schemas.openxmlformats.org/drawingml/2006/main" xmlns:r="http://schemas.openxmlformats.org/officeDocument/2006/relationships" xmlns:p="http://schemas.openxmlformats.org/presentationml/2006/main">
+  <p:cSld>
+    <p:spTree>
+      <p:nvGrpSpPr>
+        <p:cNvPr id="1" name=""/>
+        <p:cNvGrpSpPr/>
+        <p:nvPr/>
+      </p:nvGrpSpPr>
+      <p:grpSpPr>
+        <a:xfrm>
+          <a:off x="0" y="0"/>
+          <a:ext cx="0" cy="0"/>
+          <a:chOff x="0" y="0"/>
+          <a:chExt cx="0" cy="0"/>
+        </a:xfrm>
+      </p:grpSpPr>
+      <p:sp>
+        <p:nvSpPr>
+          <p:cNvPr id="2" name="Title 1">
+            <a:extLst>
+              <a:ext uri="{FF2B5EF4-FFF2-40B4-BE49-F238E27FC236}">
                 <a16:creationId xmlns:a16="http://schemas.microsoft.com/office/drawing/2014/main" id="{6B7A6A92-33E7-39D0-C3D4-ECF9E66FD84A}"/>
               </a:ext>
             </a:extLst>
@@ -5706,7 +6312,7 @@
 </p:sld>
 </file>
 
-<file path=ppt/slides/slide14.xml><?xml version="1.0" encoding="utf-8"?>
+<file path=ppt/slides/slide15.xml><?xml version="1.0" encoding="utf-8"?>
 <p:sld xmlns:a="http://schemas.openxmlformats.org/drawingml/2006/main" xmlns:r="http://schemas.openxmlformats.org/officeDocument/2006/relationships" xmlns:p="http://schemas.openxmlformats.org/presentationml/2006/main">
   <p:cSld>
     <p:spTree>
@@ -5803,7 +6409,7 @@
 </p:sld>
 </file>
 
-<file path=ppt/slides/slide15.xml><?xml version="1.0" encoding="utf-8"?>
+<file path=ppt/slides/slide16.xml><?xml version="1.0" encoding="utf-8"?>
 <p:sld xmlns:a="http://schemas.openxmlformats.org/drawingml/2006/main" xmlns:r="http://schemas.openxmlformats.org/officeDocument/2006/relationships" xmlns:p="http://schemas.openxmlformats.org/presentationml/2006/main">
   <p:cSld>
     <p:spTree>
@@ -5900,7 +6506,7 @@
 </p:sld>
 </file>
 
-<file path=ppt/slides/slide16.xml><?xml version="1.0" encoding="utf-8"?>
+<file path=ppt/slides/slide17.xml><?xml version="1.0" encoding="utf-8"?>
 <p:sld xmlns:a="http://schemas.openxmlformats.org/drawingml/2006/main" xmlns:r="http://schemas.openxmlformats.org/officeDocument/2006/relationships" xmlns:p="http://schemas.openxmlformats.org/presentationml/2006/main">
   <p:cSld>
     <p:spTree>
@@ -5997,7 +6603,7 @@
 </p:sld>
 </file>
 
-<file path=ppt/slides/slide17.xml><?xml version="1.0" encoding="utf-8"?>
+<file path=ppt/slides/slide18.xml><?xml version="1.0" encoding="utf-8"?>
 <p:sld xmlns:a="http://schemas.openxmlformats.org/drawingml/2006/main" xmlns:r="http://schemas.openxmlformats.org/officeDocument/2006/relationships" xmlns:p="http://schemas.openxmlformats.org/presentationml/2006/main">
   <p:cSld>
     <p:spTree>
@@ -6160,7 +6766,7 @@
 </p:sld>
 </file>
 
-<file path=ppt/slides/slide18.xml><?xml version="1.0" encoding="utf-8"?>
+<file path=ppt/slides/slide19.xml><?xml version="1.0" encoding="utf-8"?>
 <p:sld xmlns:a="http://schemas.openxmlformats.org/drawingml/2006/main" xmlns:r="http://schemas.openxmlformats.org/officeDocument/2006/relationships" xmlns:p="http://schemas.openxmlformats.org/presentationml/2006/main">
   <p:cSld>
     <p:spTree>

</xml_diff>